<commit_message>
ppt & data changed
</commit_message>
<xml_diff>
--- a/doc/Convolutional Neural Network.pptx
+++ b/doc/Convolutional Neural Network.pptx
@@ -6,8 +6,9 @@
   </p:sldMasterIdLst>
   <p:sldIdLst>
     <p:sldId id="256" r:id="rId2"/>
-    <p:sldId id="257" r:id="rId3"/>
+    <p:sldId id="259" r:id="rId3"/>
     <p:sldId id="258" r:id="rId4"/>
+    <p:sldId id="257" r:id="rId5"/>
   </p:sldIdLst>
   <p:sldSz cx="9144000" cy="6858000" type="screen4x3"/>
   <p:notesSz cx="6858000" cy="9144000"/>
@@ -290,7 +291,8 @@
           <a:p>
             <a:fld id="{1341731E-BA3B-499E-8ED1-A0FD9ABBEFDE}" type="datetimeFigureOut">
               <a:rPr lang="zh-CN" altLang="en-US" smtClean="0"/>
-              <a:t>2014/10/12</a:t>
+              <a:pPr/>
+              <a:t>2014/10/19</a:t>
             </a:fld>
             <a:endParaRPr lang="zh-CN" altLang="en-US"/>
           </a:p>
@@ -332,6 +334,7 @@
           <a:p>
             <a:fld id="{A465FE46-79D8-4D67-B2A0-0F16B5D3A121}" type="slidenum">
               <a:rPr lang="zh-CN" altLang="en-US" smtClean="0"/>
+              <a:pPr/>
               <a:t>‹#›</a:t>
             </a:fld>
             <a:endParaRPr lang="zh-CN" altLang="en-US"/>
@@ -455,7 +458,8 @@
           <a:p>
             <a:fld id="{1341731E-BA3B-499E-8ED1-A0FD9ABBEFDE}" type="datetimeFigureOut">
               <a:rPr lang="zh-CN" altLang="en-US" smtClean="0"/>
-              <a:t>2014/10/12</a:t>
+              <a:pPr/>
+              <a:t>2014/10/19</a:t>
             </a:fld>
             <a:endParaRPr lang="zh-CN" altLang="en-US"/>
           </a:p>
@@ -497,6 +501,7 @@
           <a:p>
             <a:fld id="{A465FE46-79D8-4D67-B2A0-0F16B5D3A121}" type="slidenum">
               <a:rPr lang="zh-CN" altLang="en-US" smtClean="0"/>
+              <a:pPr/>
               <a:t>‹#›</a:t>
             </a:fld>
             <a:endParaRPr lang="zh-CN" altLang="en-US"/>
@@ -630,7 +635,8 @@
           <a:p>
             <a:fld id="{1341731E-BA3B-499E-8ED1-A0FD9ABBEFDE}" type="datetimeFigureOut">
               <a:rPr lang="zh-CN" altLang="en-US" smtClean="0"/>
-              <a:t>2014/10/12</a:t>
+              <a:pPr/>
+              <a:t>2014/10/19</a:t>
             </a:fld>
             <a:endParaRPr lang="zh-CN" altLang="en-US"/>
           </a:p>
@@ -672,6 +678,7 @@
           <a:p>
             <a:fld id="{A465FE46-79D8-4D67-B2A0-0F16B5D3A121}" type="slidenum">
               <a:rPr lang="zh-CN" altLang="en-US" smtClean="0"/>
+              <a:pPr/>
               <a:t>‹#›</a:t>
             </a:fld>
             <a:endParaRPr lang="zh-CN" altLang="en-US"/>
@@ -795,7 +802,8 @@
           <a:p>
             <a:fld id="{1341731E-BA3B-499E-8ED1-A0FD9ABBEFDE}" type="datetimeFigureOut">
               <a:rPr lang="zh-CN" altLang="en-US" smtClean="0"/>
-              <a:t>2014/10/12</a:t>
+              <a:pPr/>
+              <a:t>2014/10/19</a:t>
             </a:fld>
             <a:endParaRPr lang="zh-CN" altLang="en-US"/>
           </a:p>
@@ -837,6 +845,7 @@
           <a:p>
             <a:fld id="{A465FE46-79D8-4D67-B2A0-0F16B5D3A121}" type="slidenum">
               <a:rPr lang="zh-CN" altLang="en-US" smtClean="0"/>
+              <a:pPr/>
               <a:t>‹#›</a:t>
             </a:fld>
             <a:endParaRPr lang="zh-CN" altLang="en-US"/>
@@ -1036,7 +1045,8 @@
           <a:p>
             <a:fld id="{1341731E-BA3B-499E-8ED1-A0FD9ABBEFDE}" type="datetimeFigureOut">
               <a:rPr lang="zh-CN" altLang="en-US" smtClean="0"/>
-              <a:t>2014/10/12</a:t>
+              <a:pPr/>
+              <a:t>2014/10/19</a:t>
             </a:fld>
             <a:endParaRPr lang="zh-CN" altLang="en-US"/>
           </a:p>
@@ -1078,6 +1088,7 @@
           <a:p>
             <a:fld id="{A465FE46-79D8-4D67-B2A0-0F16B5D3A121}" type="slidenum">
               <a:rPr lang="zh-CN" altLang="en-US" smtClean="0"/>
+              <a:pPr/>
               <a:t>‹#›</a:t>
             </a:fld>
             <a:endParaRPr lang="zh-CN" altLang="en-US"/>
@@ -1319,7 +1330,8 @@
           <a:p>
             <a:fld id="{1341731E-BA3B-499E-8ED1-A0FD9ABBEFDE}" type="datetimeFigureOut">
               <a:rPr lang="zh-CN" altLang="en-US" smtClean="0"/>
-              <a:t>2014/10/12</a:t>
+              <a:pPr/>
+              <a:t>2014/10/19</a:t>
             </a:fld>
             <a:endParaRPr lang="zh-CN" altLang="en-US"/>
           </a:p>
@@ -1361,6 +1373,7 @@
           <a:p>
             <a:fld id="{A465FE46-79D8-4D67-B2A0-0F16B5D3A121}" type="slidenum">
               <a:rPr lang="zh-CN" altLang="en-US" smtClean="0"/>
+              <a:pPr/>
               <a:t>‹#›</a:t>
             </a:fld>
             <a:endParaRPr lang="zh-CN" altLang="en-US"/>
@@ -1736,7 +1749,8 @@
           <a:p>
             <a:fld id="{1341731E-BA3B-499E-8ED1-A0FD9ABBEFDE}" type="datetimeFigureOut">
               <a:rPr lang="zh-CN" altLang="en-US" smtClean="0"/>
-              <a:t>2014/10/12</a:t>
+              <a:pPr/>
+              <a:t>2014/10/19</a:t>
             </a:fld>
             <a:endParaRPr lang="zh-CN" altLang="en-US"/>
           </a:p>
@@ -1778,6 +1792,7 @@
           <a:p>
             <a:fld id="{A465FE46-79D8-4D67-B2A0-0F16B5D3A121}" type="slidenum">
               <a:rPr lang="zh-CN" altLang="en-US" smtClean="0"/>
+              <a:pPr/>
               <a:t>‹#›</a:t>
             </a:fld>
             <a:endParaRPr lang="zh-CN" altLang="en-US"/>
@@ -1849,7 +1864,8 @@
           <a:p>
             <a:fld id="{1341731E-BA3B-499E-8ED1-A0FD9ABBEFDE}" type="datetimeFigureOut">
               <a:rPr lang="zh-CN" altLang="en-US" smtClean="0"/>
-              <a:t>2014/10/12</a:t>
+              <a:pPr/>
+              <a:t>2014/10/19</a:t>
             </a:fld>
             <a:endParaRPr lang="zh-CN" altLang="en-US"/>
           </a:p>
@@ -1891,6 +1907,7 @@
           <a:p>
             <a:fld id="{A465FE46-79D8-4D67-B2A0-0F16B5D3A121}" type="slidenum">
               <a:rPr lang="zh-CN" altLang="en-US" smtClean="0"/>
+              <a:pPr/>
               <a:t>‹#›</a:t>
             </a:fld>
             <a:endParaRPr lang="zh-CN" altLang="en-US"/>
@@ -1939,7 +1956,8 @@
           <a:p>
             <a:fld id="{1341731E-BA3B-499E-8ED1-A0FD9ABBEFDE}" type="datetimeFigureOut">
               <a:rPr lang="zh-CN" altLang="en-US" smtClean="0"/>
-              <a:t>2014/10/12</a:t>
+              <a:pPr/>
+              <a:t>2014/10/19</a:t>
             </a:fld>
             <a:endParaRPr lang="zh-CN" altLang="en-US"/>
           </a:p>
@@ -1981,6 +1999,7 @@
           <a:p>
             <a:fld id="{A465FE46-79D8-4D67-B2A0-0F16B5D3A121}" type="slidenum">
               <a:rPr lang="zh-CN" altLang="en-US" smtClean="0"/>
+              <a:pPr/>
               <a:t>‹#›</a:t>
             </a:fld>
             <a:endParaRPr lang="zh-CN" altLang="en-US"/>
@@ -2211,7 +2230,8 @@
           <a:p>
             <a:fld id="{1341731E-BA3B-499E-8ED1-A0FD9ABBEFDE}" type="datetimeFigureOut">
               <a:rPr lang="zh-CN" altLang="en-US" smtClean="0"/>
-              <a:t>2014/10/12</a:t>
+              <a:pPr/>
+              <a:t>2014/10/19</a:t>
             </a:fld>
             <a:endParaRPr lang="zh-CN" altLang="en-US"/>
           </a:p>
@@ -2253,6 +2273,7 @@
           <a:p>
             <a:fld id="{A465FE46-79D8-4D67-B2A0-0F16B5D3A121}" type="slidenum">
               <a:rPr lang="zh-CN" altLang="en-US" smtClean="0"/>
+              <a:pPr/>
               <a:t>‹#›</a:t>
             </a:fld>
             <a:endParaRPr lang="zh-CN" altLang="en-US"/>
@@ -2459,7 +2480,8 @@
           <a:p>
             <a:fld id="{1341731E-BA3B-499E-8ED1-A0FD9ABBEFDE}" type="datetimeFigureOut">
               <a:rPr lang="zh-CN" altLang="en-US" smtClean="0"/>
-              <a:t>2014/10/12</a:t>
+              <a:pPr/>
+              <a:t>2014/10/19</a:t>
             </a:fld>
             <a:endParaRPr lang="zh-CN" altLang="en-US"/>
           </a:p>
@@ -2501,6 +2523,7 @@
           <a:p>
             <a:fld id="{A465FE46-79D8-4D67-B2A0-0F16B5D3A121}" type="slidenum">
               <a:rPr lang="zh-CN" altLang="en-US" smtClean="0"/>
+              <a:pPr/>
               <a:t>‹#›</a:t>
             </a:fld>
             <a:endParaRPr lang="zh-CN" altLang="en-US"/>
@@ -2667,7 +2690,8 @@
           <a:p>
             <a:fld id="{1341731E-BA3B-499E-8ED1-A0FD9ABBEFDE}" type="datetimeFigureOut">
               <a:rPr lang="zh-CN" altLang="en-US" smtClean="0"/>
-              <a:t>2014/10/12</a:t>
+              <a:pPr/>
+              <a:t>2014/10/19</a:t>
             </a:fld>
             <a:endParaRPr lang="zh-CN" altLang="en-US"/>
           </a:p>
@@ -2745,6 +2769,7 @@
           <a:p>
             <a:fld id="{A465FE46-79D8-4D67-B2A0-0F16B5D3A121}" type="slidenum">
               <a:rPr lang="zh-CN" altLang="en-US" smtClean="0"/>
+              <a:pPr/>
               <a:t>‹#›</a:t>
             </a:fld>
             <a:endParaRPr lang="zh-CN" altLang="en-US"/>
@@ -3092,6 +3117,306 @@
 </file>
 
 <file path=ppt/slides/slide2.xml><?xml version="1.0" encoding="utf-8"?>
+<p:sld xmlns:a="http://schemas.openxmlformats.org/drawingml/2006/main" xmlns:r="http://schemas.openxmlformats.org/officeDocument/2006/relationships" xmlns:p="http://schemas.openxmlformats.org/presentationml/2006/main">
+  <p:cSld>
+    <p:spTree>
+      <p:nvGrpSpPr>
+        <p:cNvPr id="1" name=""/>
+        <p:cNvGrpSpPr/>
+        <p:nvPr/>
+      </p:nvGrpSpPr>
+      <p:grpSpPr>
+        <a:xfrm>
+          <a:off x="0" y="0"/>
+          <a:ext cx="0" cy="0"/>
+          <a:chOff x="0" y="0"/>
+          <a:chExt cx="0" cy="0"/>
+        </a:xfrm>
+      </p:grpSpPr>
+      <p:sp>
+        <p:nvSpPr>
+          <p:cNvPr id="7" name="标题 6"/>
+          <p:cNvSpPr>
+            <a:spLocks noGrp="1"/>
+          </p:cNvSpPr>
+          <p:nvPr>
+            <p:ph type="title"/>
+          </p:nvPr>
+        </p:nvSpPr>
+        <p:spPr/>
+        <p:txBody>
+          <a:bodyPr/>
+          <a:lstStyle/>
+          <a:p>
+            <a:r>
+              <a:rPr lang="en-US" altLang="zh-CN" dirty="0" smtClean="0"/>
+              <a:t>Content</a:t>
+            </a:r>
+            <a:endParaRPr lang="zh-CN" altLang="en-US" dirty="0"/>
+          </a:p>
+        </p:txBody>
+      </p:sp>
+      <p:sp>
+        <p:nvSpPr>
+          <p:cNvPr id="8" name="内容占位符 7"/>
+          <p:cNvSpPr>
+            <a:spLocks noGrp="1"/>
+          </p:cNvSpPr>
+          <p:nvPr>
+            <p:ph idx="1"/>
+          </p:nvPr>
+        </p:nvSpPr>
+        <p:spPr/>
+        <p:txBody>
+          <a:bodyPr>
+            <a:normAutofit fontScale="92500" lnSpcReduction="20000"/>
+          </a:bodyPr>
+          <a:lstStyle/>
+          <a:p>
+            <a:r>
+              <a:rPr lang="en-US" altLang="zh-CN" dirty="0" smtClean="0"/>
+              <a:t>Derivation</a:t>
+            </a:r>
+          </a:p>
+          <a:p>
+            <a:endParaRPr lang="en-US" altLang="zh-CN" dirty="0" smtClean="0"/>
+          </a:p>
+          <a:p>
+            <a:r>
+              <a:rPr lang="en-US" altLang="zh-CN" dirty="0" smtClean="0"/>
+              <a:t>Definition</a:t>
+            </a:r>
+          </a:p>
+          <a:p>
+            <a:endParaRPr lang="en-US" altLang="zh-CN" dirty="0" smtClean="0"/>
+          </a:p>
+          <a:p>
+            <a:r>
+              <a:rPr lang="en-US" altLang="zh-CN" dirty="0" smtClean="0"/>
+              <a:t>Application</a:t>
+            </a:r>
+          </a:p>
+          <a:p>
+            <a:endParaRPr lang="en-US" altLang="zh-CN" dirty="0" smtClean="0"/>
+          </a:p>
+          <a:p>
+            <a:r>
+              <a:rPr lang="en-US" altLang="zh-CN" dirty="0" smtClean="0"/>
+              <a:t>Implementation</a:t>
+            </a:r>
+          </a:p>
+          <a:p>
+            <a:endParaRPr lang="en-US" altLang="zh-CN" dirty="0" smtClean="0"/>
+          </a:p>
+          <a:p>
+            <a:r>
+              <a:rPr lang="en-US" altLang="zh-CN" dirty="0" smtClean="0"/>
+              <a:t>Extension</a:t>
+            </a:r>
+            <a:endParaRPr lang="en-US" altLang="zh-CN" dirty="0" smtClean="0"/>
+          </a:p>
+          <a:p>
+            <a:endParaRPr lang="zh-CN" altLang="en-US" dirty="0"/>
+          </a:p>
+        </p:txBody>
+      </p:sp>
+    </p:spTree>
+  </p:cSld>
+  <p:clrMapOvr>
+    <a:masterClrMapping/>
+  </p:clrMapOvr>
+</p:sld>
+</file>
+
+<file path=ppt/slides/slide3.xml><?xml version="1.0" encoding="utf-8"?>
+<p:sld xmlns:a="http://schemas.openxmlformats.org/drawingml/2006/main" xmlns:r="http://schemas.openxmlformats.org/officeDocument/2006/relationships" xmlns:p="http://schemas.openxmlformats.org/presentationml/2006/main">
+  <p:cSld>
+    <p:spTree>
+      <p:nvGrpSpPr>
+        <p:cNvPr id="1" name=""/>
+        <p:cNvGrpSpPr/>
+        <p:nvPr/>
+      </p:nvGrpSpPr>
+      <p:grpSpPr>
+        <a:xfrm>
+          <a:off x="0" y="0"/>
+          <a:ext cx="0" cy="0"/>
+          <a:chOff x="0" y="0"/>
+          <a:chExt cx="0" cy="0"/>
+        </a:xfrm>
+      </p:grpSpPr>
+      <p:sp>
+        <p:nvSpPr>
+          <p:cNvPr id="2" name="矩形 1"/>
+          <p:cNvSpPr/>
+          <p:nvPr/>
+        </p:nvSpPr>
+        <p:spPr>
+          <a:xfrm>
+            <a:off x="3059832" y="2852936"/>
+            <a:ext cx="3237296" cy="646331"/>
+          </a:xfrm>
+          <a:prstGeom prst="rect">
+            <a:avLst/>
+          </a:prstGeom>
+        </p:spPr>
+        <p:txBody>
+          <a:bodyPr wrap="none">
+            <a:spAutoFit/>
+          </a:bodyPr>
+          <a:lstStyle/>
+          <a:p>
+            <a:r>
+              <a:rPr lang="en-US" altLang="zh-CN" sz="3600" b="1" dirty="0">
+                <a:effectLst>
+                  <a:outerShdw blurRad="38100" dist="38100" dir="2700000" algn="tl">
+                    <a:srgbClr val="000000">
+                      <a:alpha val="43137"/>
+                    </a:srgbClr>
+                  </a:outerShdw>
+                </a:effectLst>
+              </a:rPr>
+              <a:t>Neural Network</a:t>
+            </a:r>
+            <a:endParaRPr lang="zh-CN" altLang="en-US" sz="3600" b="1" dirty="0">
+              <a:effectLst>
+                <a:outerShdw blurRad="38100" dist="38100" dir="2700000" algn="tl">
+                  <a:srgbClr val="000000">
+                    <a:alpha val="43137"/>
+                  </a:srgbClr>
+                </a:outerShdw>
+              </a:effectLst>
+            </a:endParaRPr>
+          </a:p>
+        </p:txBody>
+      </p:sp>
+      <p:sp>
+        <p:nvSpPr>
+          <p:cNvPr id="3" name="TextBox 2"/>
+          <p:cNvSpPr txBox="1"/>
+          <p:nvPr/>
+        </p:nvSpPr>
+        <p:spPr>
+          <a:xfrm>
+            <a:off x="1547664" y="4005064"/>
+            <a:ext cx="2401748" cy="461665"/>
+          </a:xfrm>
+          <a:prstGeom prst="rect">
+            <a:avLst/>
+          </a:prstGeom>
+          <a:noFill/>
+        </p:spPr>
+        <p:txBody>
+          <a:bodyPr wrap="none" rtlCol="0">
+            <a:spAutoFit/>
+          </a:bodyPr>
+          <a:lstStyle/>
+          <a:p>
+            <a:r>
+              <a:rPr lang="en-US" altLang="zh-CN" sz="2400" dirty="0" smtClean="0"/>
+              <a:t>Layer/Connection</a:t>
+            </a:r>
+            <a:endParaRPr lang="en-US" altLang="zh-CN" sz="2400" dirty="0" smtClean="0"/>
+          </a:p>
+        </p:txBody>
+      </p:sp>
+      <p:sp>
+        <p:nvSpPr>
+          <p:cNvPr id="4" name="TextBox 3"/>
+          <p:cNvSpPr txBox="1"/>
+          <p:nvPr/>
+        </p:nvSpPr>
+        <p:spPr>
+          <a:xfrm>
+            <a:off x="5364088" y="2060848"/>
+            <a:ext cx="2349618" cy="461665"/>
+          </a:xfrm>
+          <a:prstGeom prst="rect">
+            <a:avLst/>
+          </a:prstGeom>
+          <a:noFill/>
+        </p:spPr>
+        <p:txBody>
+          <a:bodyPr wrap="none" rtlCol="0">
+            <a:spAutoFit/>
+          </a:bodyPr>
+          <a:lstStyle/>
+          <a:p>
+            <a:r>
+              <a:rPr lang="en-US" altLang="zh-CN" sz="2400" dirty="0" smtClean="0"/>
+              <a:t>Back Propagation</a:t>
+            </a:r>
+          </a:p>
+        </p:txBody>
+      </p:sp>
+      <p:sp>
+        <p:nvSpPr>
+          <p:cNvPr id="5" name="TextBox 4"/>
+          <p:cNvSpPr txBox="1"/>
+          <p:nvPr/>
+        </p:nvSpPr>
+        <p:spPr>
+          <a:xfrm>
+            <a:off x="1835696" y="1988840"/>
+            <a:ext cx="1896353" cy="461665"/>
+          </a:xfrm>
+          <a:prstGeom prst="rect">
+            <a:avLst/>
+          </a:prstGeom>
+          <a:noFill/>
+        </p:spPr>
+        <p:txBody>
+          <a:bodyPr wrap="none" rtlCol="0">
+            <a:spAutoFit/>
+          </a:bodyPr>
+          <a:lstStyle/>
+          <a:p>
+            <a:r>
+              <a:rPr lang="en-US" altLang="zh-CN" sz="2400" dirty="0" smtClean="0"/>
+              <a:t>Feed Forward</a:t>
+            </a:r>
+            <a:endParaRPr lang="en-US" altLang="zh-CN" sz="2400" dirty="0" smtClean="0"/>
+          </a:p>
+        </p:txBody>
+      </p:sp>
+      <p:sp>
+        <p:nvSpPr>
+          <p:cNvPr id="6" name="TextBox 5"/>
+          <p:cNvSpPr txBox="1"/>
+          <p:nvPr/>
+        </p:nvSpPr>
+        <p:spPr>
+          <a:xfrm>
+            <a:off x="5580112" y="4005064"/>
+            <a:ext cx="2116477" cy="461665"/>
+          </a:xfrm>
+          <a:prstGeom prst="rect">
+            <a:avLst/>
+          </a:prstGeom>
+          <a:noFill/>
+        </p:spPr>
+        <p:txBody>
+          <a:bodyPr wrap="none" rtlCol="0">
+            <a:spAutoFit/>
+          </a:bodyPr>
+          <a:lstStyle/>
+          <a:p>
+            <a:r>
+              <a:rPr lang="en-US" altLang="zh-CN" sz="2400" dirty="0" smtClean="0"/>
+              <a:t>Active Function</a:t>
+            </a:r>
+          </a:p>
+        </p:txBody>
+      </p:sp>
+    </p:spTree>
+  </p:cSld>
+  <p:clrMapOvr>
+    <a:masterClrMapping/>
+  </p:clrMapOvr>
+</p:sld>
+</file>
+
+<file path=ppt/slides/slide4.xml><?xml version="1.0" encoding="utf-8"?>
 <p:sld xmlns:a="http://schemas.openxmlformats.org/drawingml/2006/main" xmlns:r="http://schemas.openxmlformats.org/officeDocument/2006/relationships" xmlns:p="http://schemas.openxmlformats.org/presentationml/2006/main">
   <p:cSld>
     <p:spTree>
@@ -4946,134 +5271,6 @@
 </p:sld>
 </file>
 
-<file path=ppt/slides/slide3.xml><?xml version="1.0" encoding="utf-8"?>
-<p:sld xmlns:a="http://schemas.openxmlformats.org/drawingml/2006/main" xmlns:r="http://schemas.openxmlformats.org/officeDocument/2006/relationships" xmlns:p="http://schemas.openxmlformats.org/presentationml/2006/main">
-  <p:cSld>
-    <p:spTree>
-      <p:nvGrpSpPr>
-        <p:cNvPr id="1" name=""/>
-        <p:cNvGrpSpPr/>
-        <p:nvPr/>
-      </p:nvGrpSpPr>
-      <p:grpSpPr>
-        <a:xfrm>
-          <a:off x="0" y="0"/>
-          <a:ext cx="0" cy="0"/>
-          <a:chOff x="0" y="0"/>
-          <a:chExt cx="0" cy="0"/>
-        </a:xfrm>
-      </p:grpSpPr>
-      <p:sp>
-        <p:nvSpPr>
-          <p:cNvPr id="2" name="矩形 1"/>
-          <p:cNvSpPr/>
-          <p:nvPr/>
-        </p:nvSpPr>
-        <p:spPr>
-          <a:xfrm>
-            <a:off x="3059832" y="2852936"/>
-            <a:ext cx="3237296" cy="646331"/>
-          </a:xfrm>
-          <a:prstGeom prst="rect">
-            <a:avLst/>
-          </a:prstGeom>
-        </p:spPr>
-        <p:txBody>
-          <a:bodyPr wrap="none">
-            <a:spAutoFit/>
-          </a:bodyPr>
-          <a:lstStyle/>
-          <a:p>
-            <a:r>
-              <a:rPr lang="en-US" altLang="zh-CN" sz="3600" b="1" dirty="0">
-                <a:effectLst>
-                  <a:outerShdw blurRad="38100" dist="38100" dir="2700000" algn="tl">
-                    <a:srgbClr val="000000">
-                      <a:alpha val="43137"/>
-                    </a:srgbClr>
-                  </a:outerShdw>
-                </a:effectLst>
-              </a:rPr>
-              <a:t>Neural Network</a:t>
-            </a:r>
-            <a:endParaRPr lang="zh-CN" altLang="en-US" sz="3600" b="1" dirty="0">
-              <a:effectLst>
-                <a:outerShdw blurRad="38100" dist="38100" dir="2700000" algn="tl">
-                  <a:srgbClr val="000000">
-                    <a:alpha val="43137"/>
-                  </a:srgbClr>
-                </a:outerShdw>
-              </a:effectLst>
-            </a:endParaRPr>
-          </a:p>
-        </p:txBody>
-      </p:sp>
-      <p:sp>
-        <p:nvSpPr>
-          <p:cNvPr id="3" name="TextBox 2"/>
-          <p:cNvSpPr txBox="1"/>
-          <p:nvPr/>
-        </p:nvSpPr>
-        <p:spPr>
-          <a:xfrm>
-            <a:off x="1691680" y="2060848"/>
-            <a:ext cx="2127505" cy="461665"/>
-          </a:xfrm>
-          <a:prstGeom prst="rect">
-            <a:avLst/>
-          </a:prstGeom>
-          <a:noFill/>
-        </p:spPr>
-        <p:txBody>
-          <a:bodyPr wrap="none" rtlCol="0">
-            <a:spAutoFit/>
-          </a:bodyPr>
-          <a:lstStyle/>
-          <a:p>
-            <a:r>
-              <a:rPr lang="en-US" altLang="zh-CN" sz="2400" dirty="0" smtClean="0"/>
-              <a:t>Full Connection</a:t>
-            </a:r>
-          </a:p>
-        </p:txBody>
-      </p:sp>
-      <p:sp>
-        <p:nvSpPr>
-          <p:cNvPr id="4" name="TextBox 3"/>
-          <p:cNvSpPr txBox="1"/>
-          <p:nvPr/>
-        </p:nvSpPr>
-        <p:spPr>
-          <a:xfrm>
-            <a:off x="5364088" y="2060848"/>
-            <a:ext cx="2349618" cy="461665"/>
-          </a:xfrm>
-          <a:prstGeom prst="rect">
-            <a:avLst/>
-          </a:prstGeom>
-          <a:noFill/>
-        </p:spPr>
-        <p:txBody>
-          <a:bodyPr wrap="none" rtlCol="0">
-            <a:spAutoFit/>
-          </a:bodyPr>
-          <a:lstStyle/>
-          <a:p>
-            <a:r>
-              <a:rPr lang="en-US" altLang="zh-CN" sz="2400" dirty="0" smtClean="0"/>
-              <a:t>Back Propagation</a:t>
-            </a:r>
-          </a:p>
-        </p:txBody>
-      </p:sp>
-    </p:spTree>
-  </p:cSld>
-  <p:clrMapOvr>
-    <a:masterClrMapping/>
-  </p:clrMapOvr>
-</p:sld>
-</file>
-
 <file path=ppt/theme/theme1.xml><?xml version="1.0" encoding="utf-8"?>
 <a:theme xmlns:a="http://schemas.openxmlformats.org/drawingml/2006/main" name="Office 主题">
   <a:themeElements>

</xml_diff>